<commit_message>
wip active infernece class
</commit_message>
<xml_diff>
--- a/lessons/notebooks/figures/fig-online-active-inference.pptx
+++ b/lessons/notebooks/figures/fig-online-active-inference.pptx
@@ -125,6 +125,9 @@
         </p15:guide>
       </p15:sldGuideLst>
     </p:ext>
+    <p:ext uri="{2D200454-40CA-4A62-9FC3-DE9A4176ACB9}">
+      <p15:notesGuideLst xmlns:p15="http://schemas.microsoft.com/office/powerpoint/2012/main"/>
+    </p:ext>
   </p:extLst>
 </p:presentation>
 </file>
@@ -223,7 +226,7 @@
           <a:p>
             <a:fld id="{B2DAE26E-1A3C-384E-9015-34D0DF8AD49D}" type="datetimeFigureOut">
               <a:rPr lang="en-US" smtClean="0"/>
-              <a:t>8/28/19</a:t>
+              <a:t>8/30/2019</a:t>
             </a:fld>
             <a:endParaRPr lang="en-US"/>
           </a:p>
@@ -400,7 +403,7 @@
           <a:p>
             <a:fld id="{B517BF2B-D9C8-2B42-A233-4F07BCF3CC92}" type="datetimeFigureOut">
               <a:rPr lang="en-US" smtClean="0"/>
-              <a:t>8/28/19</a:t>
+              <a:t>8/30/2019</a:t>
             </a:fld>
             <a:endParaRPr lang="en-US"/>
           </a:p>
@@ -882,7 +885,7 @@
           <a:p>
             <a:fld id="{A8460AB8-2B37-E04B-8444-4CEC5A158CAC}" type="datetimeFigureOut">
               <a:rPr lang="en-US" smtClean="0"/>
-              <a:t>8/28/19</a:t>
+              <a:t>8/30/2019</a:t>
             </a:fld>
             <a:endParaRPr lang="en-US"/>
           </a:p>
@@ -1052,7 +1055,7 @@
           <a:p>
             <a:fld id="{A8460AB8-2B37-E04B-8444-4CEC5A158CAC}" type="datetimeFigureOut">
               <a:rPr lang="en-US" smtClean="0"/>
-              <a:t>8/28/19</a:t>
+              <a:t>8/30/2019</a:t>
             </a:fld>
             <a:endParaRPr lang="en-US"/>
           </a:p>
@@ -1232,7 +1235,7 @@
           <a:p>
             <a:fld id="{A8460AB8-2B37-E04B-8444-4CEC5A158CAC}" type="datetimeFigureOut">
               <a:rPr lang="en-US" smtClean="0"/>
-              <a:t>8/28/19</a:t>
+              <a:t>8/30/2019</a:t>
             </a:fld>
             <a:endParaRPr lang="en-US"/>
           </a:p>
@@ -1402,7 +1405,7 @@
           <a:p>
             <a:fld id="{A8460AB8-2B37-E04B-8444-4CEC5A158CAC}" type="datetimeFigureOut">
               <a:rPr lang="en-US" smtClean="0"/>
-              <a:t>8/28/19</a:t>
+              <a:t>8/30/2019</a:t>
             </a:fld>
             <a:endParaRPr lang="en-US"/>
           </a:p>
@@ -1646,7 +1649,7 @@
           <a:p>
             <a:fld id="{A8460AB8-2B37-E04B-8444-4CEC5A158CAC}" type="datetimeFigureOut">
               <a:rPr lang="en-US" smtClean="0"/>
-              <a:t>8/28/19</a:t>
+              <a:t>8/30/2019</a:t>
             </a:fld>
             <a:endParaRPr lang="en-US"/>
           </a:p>
@@ -1878,7 +1881,7 @@
           <a:p>
             <a:fld id="{A8460AB8-2B37-E04B-8444-4CEC5A158CAC}" type="datetimeFigureOut">
               <a:rPr lang="en-US" smtClean="0"/>
-              <a:t>8/28/19</a:t>
+              <a:t>8/30/2019</a:t>
             </a:fld>
             <a:endParaRPr lang="en-US"/>
           </a:p>
@@ -2245,7 +2248,7 @@
           <a:p>
             <a:fld id="{A8460AB8-2B37-E04B-8444-4CEC5A158CAC}" type="datetimeFigureOut">
               <a:rPr lang="en-US" smtClean="0"/>
-              <a:t>8/28/19</a:t>
+              <a:t>8/30/2019</a:t>
             </a:fld>
             <a:endParaRPr lang="en-US"/>
           </a:p>
@@ -2363,7 +2366,7 @@
           <a:p>
             <a:fld id="{A8460AB8-2B37-E04B-8444-4CEC5A158CAC}" type="datetimeFigureOut">
               <a:rPr lang="en-US" smtClean="0"/>
-              <a:t>8/28/19</a:t>
+              <a:t>8/30/2019</a:t>
             </a:fld>
             <a:endParaRPr lang="en-US"/>
           </a:p>
@@ -2720,7 +2723,7 @@
           <a:p>
             <a:fld id="{A8460AB8-2B37-E04B-8444-4CEC5A158CAC}" type="datetimeFigureOut">
               <a:rPr lang="en-US" smtClean="0"/>
-              <a:t>8/28/19</a:t>
+              <a:t>8/30/2019</a:t>
             </a:fld>
             <a:endParaRPr lang="en-US"/>
           </a:p>
@@ -2977,7 +2980,7 @@
           <a:p>
             <a:fld id="{A8460AB8-2B37-E04B-8444-4CEC5A158CAC}" type="datetimeFigureOut">
               <a:rPr lang="en-US" smtClean="0"/>
-              <a:t>8/28/19</a:t>
+              <a:t>8/30/2019</a:t>
             </a:fld>
             <a:endParaRPr lang="en-US"/>
           </a:p>
@@ -3190,7 +3193,7 @@
           <a:p>
             <a:fld id="{A8460AB8-2B37-E04B-8444-4CEC5A158CAC}" type="datetimeFigureOut">
               <a:rPr lang="en-US" smtClean="0"/>
-              <a:t>8/28/19</a:t>
+              <a:t>8/30/2019</a:t>
             </a:fld>
             <a:endParaRPr lang="en-US"/>
           </a:p>
@@ -3607,10 +3610,10 @@
       </p:grpSpPr>
       <p:grpSp>
         <p:nvGrpSpPr>
-          <p:cNvPr id="518" name="Group 517">
+          <p:cNvPr id="3" name="Group 2">
             <a:extLst>
               <a:ext uri="{FF2B5EF4-FFF2-40B4-BE49-F238E27FC236}">
-                <a16:creationId xmlns:a16="http://schemas.microsoft.com/office/drawing/2014/main" id="{716F12BF-E55C-1841-8EF1-93AAE89C4D26}"/>
+                <a16:creationId xmlns:a16="http://schemas.microsoft.com/office/drawing/2014/main" id="{168242BE-F2E6-4DF8-BD43-7CF56ED0C6DE}"/>
               </a:ext>
             </a:extLst>
           </p:cNvPr>
@@ -3652,6 +3655,9 @@
               </a:schemeClr>
             </a:solidFill>
             <a:ln>
+              <a:solidFill>
+                <a:srgbClr val="FF0000"/>
+              </a:solidFill>
               <a:prstDash val="dash"/>
             </a:ln>
           </p:spPr>
@@ -5033,7 +5039,7 @@
             </a:solidFill>
             <a:ln w="19050">
               <a:solidFill>
-                <a:schemeClr val="tx1"/>
+                <a:srgbClr val="FF0000"/>
               </a:solidFill>
             </a:ln>
           </p:spPr>
@@ -5631,7 +5637,7 @@
             </a:solidFill>
             <a:ln w="19050">
               <a:solidFill>
-                <a:schemeClr val="tx1"/>
+                <a:srgbClr val="FF0000"/>
               </a:solidFill>
             </a:ln>
           </p:spPr>
@@ -5843,8 +5849,8 @@
               </a:p>
             </p:txBody>
           </p:sp>
-          <mc:AlternateContent xmlns:mc="http://schemas.openxmlformats.org/markup-compatibility/2006">
-            <mc:Choice xmlns:a14="http://schemas.microsoft.com/office/drawing/2010/main" Requires="a14">
+          <mc:AlternateContent xmlns:mc="http://schemas.openxmlformats.org/markup-compatibility/2006" xmlns:a14="http://schemas.microsoft.com/office/drawing/2010/main">
+            <mc:Choice Requires="a14">
               <p:sp>
                 <p:nvSpPr>
                   <p:cNvPr id="178" name="TextBox 177">
@@ -5873,6 +5879,7 @@
                   </a:bodyPr>
                   <a:lstStyle/>
                   <a:p>
+                    <a:pPr/>
                     <a14:m>
                       <m:oMathPara xmlns:m="http://schemas.openxmlformats.org/officeDocument/2006/math">
                         <m:oMathParaPr>
@@ -5912,7 +5919,7 @@
                 </p:txBody>
               </p:sp>
             </mc:Choice>
-            <mc:Fallback>
+            <mc:Fallback xmlns="">
               <p:sp>
                 <p:nvSpPr>
                   <p:cNvPr id="178" name="TextBox 177">
@@ -6133,6 +6140,7 @@
                 </a:bodyPr>
                 <a:lstStyle/>
                 <a:p>
+                  <a:pPr/>
                   <a14:m>
                     <m:oMathPara xmlns:m="http://schemas.openxmlformats.org/officeDocument/2006/math">
                       <m:oMathParaPr>
@@ -6204,7 +6212,7 @@
                 <a:blipFill>
                   <a:blip r:embed="rId4"/>
                   <a:stretch>
-                    <a:fillRect l="-4615" r="-1538" b="-15000"/>
+                    <a:fillRect/>
                   </a:stretch>
                 </a:blipFill>
               </p:spPr>
@@ -6253,6 +6261,7 @@
                 </a:bodyPr>
                 <a:lstStyle/>
                 <a:p>
+                  <a:pPr/>
                   <a14:m>
                     <m:oMathPara xmlns:m="http://schemas.openxmlformats.org/officeDocument/2006/math">
                       <m:oMathParaPr>
@@ -6318,7 +6327,7 @@
                 <a:blipFill>
                   <a:blip r:embed="rId5"/>
                   <a:stretch>
-                    <a:fillRect l="-11429" r="-2857" b="-15000"/>
+                    <a:fillRect/>
                   </a:stretch>
                 </a:blipFill>
               </p:spPr>
@@ -6367,6 +6376,7 @@
                 </a:bodyPr>
                 <a:lstStyle/>
                 <a:p>
+                  <a:pPr/>
                   <a14:m>
                     <m:oMathPara xmlns:m="http://schemas.openxmlformats.org/officeDocument/2006/math">
                       <m:oMathParaPr>
@@ -6438,7 +6448,7 @@
                 <a:blipFill>
                   <a:blip r:embed="rId6"/>
                   <a:stretch>
-                    <a:fillRect l="-4545" r="-3030" b="-15000"/>
+                    <a:fillRect/>
                   </a:stretch>
                 </a:blipFill>
               </p:spPr>
@@ -6487,6 +6497,7 @@
                 </a:bodyPr>
                 <a:lstStyle/>
                 <a:p>
+                  <a:pPr/>
                   <a14:m>
                     <m:oMathPara xmlns:m="http://schemas.openxmlformats.org/officeDocument/2006/math">
                       <m:oMathParaPr>
@@ -6564,7 +6575,7 @@
                 <a:blipFill>
                   <a:blip r:embed="rId7"/>
                   <a:stretch>
-                    <a:fillRect l="-4478" r="-1493" b="-15000"/>
+                    <a:fillRect/>
                   </a:stretch>
                 </a:blipFill>
               </p:spPr>
@@ -6613,6 +6624,7 @@
                 </a:bodyPr>
                 <a:lstStyle/>
                 <a:p>
+                  <a:pPr/>
                   <a14:m>
                     <m:oMathPara xmlns:m="http://schemas.openxmlformats.org/officeDocument/2006/math">
                       <m:oMathParaPr>
@@ -6678,7 +6690,7 @@
                 <a:blipFill>
                   <a:blip r:embed="rId8"/>
                   <a:stretch>
-                    <a:fillRect l="-7692" r="-5128" b="-15000"/>
+                    <a:fillRect/>
                   </a:stretch>
                 </a:blipFill>
               </p:spPr>
@@ -6727,6 +6739,7 @@
                 </a:bodyPr>
                 <a:lstStyle/>
                 <a:p>
+                  <a:pPr/>
                   <a14:m>
                     <m:oMathPara xmlns:m="http://schemas.openxmlformats.org/officeDocument/2006/math">
                       <m:oMathParaPr>
@@ -6798,7 +6811,7 @@
                 <a:blipFill>
                   <a:blip r:embed="rId9"/>
                   <a:stretch>
-                    <a:fillRect l="-5714" r="-1429" b="-15000"/>
+                    <a:fillRect/>
                   </a:stretch>
                 </a:blipFill>
               </p:spPr>
@@ -6847,6 +6860,7 @@
                 </a:bodyPr>
                 <a:lstStyle/>
                 <a:p>
+                  <a:pPr/>
                   <a14:m>
                     <m:oMathPara xmlns:m="http://schemas.openxmlformats.org/officeDocument/2006/math">
                       <m:oMathParaPr>
@@ -6918,7 +6932,7 @@
                 <a:blipFill>
                   <a:blip r:embed="rId10"/>
                   <a:stretch>
-                    <a:fillRect l="-4286" r="-1429" b="-15000"/>
+                    <a:fillRect/>
                   </a:stretch>
                 </a:blipFill>
               </p:spPr>
@@ -6967,6 +6981,7 @@
                 </a:bodyPr>
                 <a:lstStyle/>
                 <a:p>
+                  <a:pPr/>
                   <a14:m>
                     <m:oMathPara xmlns:m="http://schemas.openxmlformats.org/officeDocument/2006/math">
                       <m:oMathParaPr>
@@ -7044,7 +7059,7 @@
                 <a:blipFill>
                   <a:blip r:embed="rId11"/>
                   <a:stretch>
-                    <a:fillRect l="-4167" b="-15000"/>
+                    <a:fillRect/>
                   </a:stretch>
                 </a:blipFill>
               </p:spPr>
@@ -7093,6 +7108,7 @@
                 </a:bodyPr>
                 <a:lstStyle/>
                 <a:p>
+                  <a:pPr/>
                   <a14:m>
                     <m:oMathPara xmlns:m="http://schemas.openxmlformats.org/officeDocument/2006/math">
                       <m:oMathParaPr>
@@ -7158,7 +7174,7 @@
                 <a:blipFill>
                   <a:blip r:embed="rId12"/>
                   <a:stretch>
-                    <a:fillRect l="-7895" r="-5263" b="-15000"/>
+                    <a:fillRect/>
                   </a:stretch>
                 </a:blipFill>
               </p:spPr>
@@ -7207,6 +7223,7 @@
                 </a:bodyPr>
                 <a:lstStyle/>
                 <a:p>
+                  <a:pPr/>
                   <a14:m>
                     <m:oMathPara xmlns:m="http://schemas.openxmlformats.org/officeDocument/2006/math">
                       <m:oMathParaPr>
@@ -7278,7 +7295,7 @@
                 <a:blipFill>
                   <a:blip r:embed="rId13"/>
                   <a:stretch>
-                    <a:fillRect l="-4348" r="-1449" b="-15000"/>
+                    <a:fillRect/>
                   </a:stretch>
                 </a:blipFill>
               </p:spPr>
@@ -7327,6 +7344,7 @@
                 </a:bodyPr>
                 <a:lstStyle/>
                 <a:p>
+                  <a:pPr/>
                   <a14:m>
                     <m:oMathPara xmlns:m="http://schemas.openxmlformats.org/officeDocument/2006/math">
                       <m:oMathParaPr>
@@ -7404,7 +7422,7 @@
                 <a:blipFill>
                   <a:blip r:embed="rId14"/>
                   <a:stretch>
-                    <a:fillRect l="-4286" r="-1429" b="-15000"/>
+                    <a:fillRect/>
                   </a:stretch>
                 </a:blipFill>
               </p:spPr>
@@ -7453,6 +7471,7 @@
                 </a:bodyPr>
                 <a:lstStyle/>
                 <a:p>
+                  <a:pPr/>
                   <a14:m>
                     <m:oMathPara xmlns:m="http://schemas.openxmlformats.org/officeDocument/2006/math">
                       <m:oMathParaPr>
@@ -7518,7 +7537,7 @@
                 <a:blipFill>
                   <a:blip r:embed="rId15"/>
                   <a:stretch>
-                    <a:fillRect l="-18421" r="-2632" b="-22500"/>
+                    <a:fillRect/>
                   </a:stretch>
                 </a:blipFill>
               </p:spPr>
@@ -7567,6 +7586,7 @@
                 </a:bodyPr>
                 <a:lstStyle/>
                 <a:p>
+                  <a:pPr/>
                   <a14:m>
                     <m:oMathPara xmlns:m="http://schemas.openxmlformats.org/officeDocument/2006/math">
                       <m:oMathParaPr>
@@ -7632,7 +7652,7 @@
                 <a:blipFill>
                   <a:blip r:embed="rId16"/>
                   <a:stretch>
-                    <a:fillRect l="-2273" b="-15000"/>
+                    <a:fillRect/>
                   </a:stretch>
                 </a:blipFill>
               </p:spPr>
@@ -8674,7 +8694,7 @@
             </a:solidFill>
             <a:ln w="19050">
               <a:solidFill>
-                <a:schemeClr val="tx1"/>
+                <a:srgbClr val="FF0000"/>
               </a:solidFill>
             </a:ln>
           </p:spPr>
@@ -9272,7 +9292,7 @@
             </a:solidFill>
             <a:ln w="19050">
               <a:solidFill>
-                <a:schemeClr val="tx1"/>
+                <a:srgbClr val="FF0000"/>
               </a:solidFill>
             </a:ln>
           </p:spPr>
@@ -9497,6 +9517,7 @@
                 </a:bodyPr>
                 <a:lstStyle/>
                 <a:p>
+                  <a:pPr/>
                   <a14:m>
                     <m:oMathPara xmlns:m="http://schemas.openxmlformats.org/officeDocument/2006/math">
                       <m:oMathParaPr>
@@ -9568,7 +9589,7 @@
                 <a:blipFill>
                   <a:blip r:embed="rId17"/>
                   <a:stretch>
-                    <a:fillRect l="-4286" r="-1429" b="-15385"/>
+                    <a:fillRect/>
                   </a:stretch>
                 </a:blipFill>
               </p:spPr>
@@ -10110,7 +10131,7 @@
             </a:solidFill>
             <a:ln w="19050">
               <a:solidFill>
-                <a:schemeClr val="tx1"/>
+                <a:srgbClr val="FF0000"/>
               </a:solidFill>
             </a:ln>
           </p:spPr>
@@ -11102,7 +11123,7 @@
             </a:solidFill>
             <a:ln w="19050">
               <a:solidFill>
-                <a:schemeClr val="tx1"/>
+                <a:srgbClr val="FF0000"/>
               </a:solidFill>
             </a:ln>
           </p:spPr>
@@ -11210,7 +11231,7 @@
             </a:solidFill>
             <a:ln w="19050">
               <a:solidFill>
-                <a:schemeClr val="tx1"/>
+                <a:srgbClr val="FF0000"/>
               </a:solidFill>
             </a:ln>
           </p:spPr>
@@ -11381,6 +11402,7 @@
                 </a:bodyPr>
                 <a:lstStyle/>
                 <a:p>
+                  <a:pPr/>
                   <a14:m>
                     <m:oMathPara xmlns:m="http://schemas.openxmlformats.org/officeDocument/2006/math">
                       <m:oMathParaPr>
@@ -11446,7 +11468,7 @@
                 <a:blipFill>
                   <a:blip r:embed="rId18"/>
                   <a:stretch>
-                    <a:fillRect l="-11765" r="-5882" b="-15000"/>
+                    <a:fillRect/>
                   </a:stretch>
                 </a:blipFill>
               </p:spPr>
@@ -13439,6 +13461,7 @@
                 </a:bodyPr>
                 <a:lstStyle/>
                 <a:p>
+                  <a:pPr/>
                   <a14:m>
                     <m:oMathPara xmlns:m="http://schemas.openxmlformats.org/officeDocument/2006/math">
                       <m:oMathParaPr>
@@ -13522,7 +13545,7 @@
                 <a:blipFill>
                   <a:blip r:embed="rId19"/>
                   <a:stretch>
-                    <a:fillRect l="-3061" r="-2041" b="-15000"/>
+                    <a:fillRect/>
                   </a:stretch>
                 </a:blipFill>
               </p:spPr>
@@ -13571,6 +13594,7 @@
                 </a:bodyPr>
                 <a:lstStyle/>
                 <a:p>
+                  <a:pPr/>
                   <a14:m>
                     <m:oMathPara xmlns:m="http://schemas.openxmlformats.org/officeDocument/2006/math">
                       <m:oMathParaPr>
@@ -13654,7 +13678,7 @@
                 <a:blipFill>
                   <a:blip r:embed="rId20"/>
                   <a:stretch>
-                    <a:fillRect l="-2970" r="-990" b="-15000"/>
+                    <a:fillRect/>
                   </a:stretch>
                 </a:blipFill>
               </p:spPr>
@@ -13703,6 +13727,7 @@
                 </a:bodyPr>
                 <a:lstStyle/>
                 <a:p>
+                  <a:pPr/>
                   <a14:m>
                     <m:oMathPara xmlns:m="http://schemas.openxmlformats.org/officeDocument/2006/math">
                       <m:oMathParaPr>
@@ -13786,7 +13811,7 @@
                 <a:blipFill>
                   <a:blip r:embed="rId21"/>
                   <a:stretch>
-                    <a:fillRect l="-2941" r="-1961" b="-15000"/>
+                    <a:fillRect/>
                   </a:stretch>
                 </a:blipFill>
               </p:spPr>
@@ -13835,6 +13860,7 @@
                 </a:bodyPr>
                 <a:lstStyle/>
                 <a:p>
+                  <a:pPr/>
                   <a14:m>
                     <m:oMathPara xmlns:m="http://schemas.openxmlformats.org/officeDocument/2006/math">
                       <m:oMathParaPr>
@@ -13910,9 +13936,9 @@
                   <a:avLst/>
                 </a:prstGeom>
                 <a:blipFill>
-                  <a:blip r:embed="rId7"/>
+                  <a:blip r:embed="rId22"/>
                   <a:stretch>
-                    <a:fillRect l="-4478" r="-1493" b="-15000"/>
+                    <a:fillRect/>
                   </a:stretch>
                 </a:blipFill>
               </p:spPr>
@@ -13961,6 +13987,7 @@
                 </a:bodyPr>
                 <a:lstStyle/>
                 <a:p>
+                  <a:pPr/>
                   <a14:m>
                     <m:oMathPara xmlns:m="http://schemas.openxmlformats.org/officeDocument/2006/math">
                       <m:oMathParaPr>
@@ -14036,9 +14063,9 @@
                   <a:avLst/>
                 </a:prstGeom>
                 <a:blipFill>
-                  <a:blip r:embed="rId7"/>
+                  <a:blip r:embed="rId23"/>
                   <a:stretch>
-                    <a:fillRect l="-4478" r="-1493" b="-15000"/>
+                    <a:fillRect/>
                   </a:stretch>
                 </a:blipFill>
               </p:spPr>
@@ -14057,6 +14084,123 @@
             </p:sp>
           </mc:Fallback>
         </mc:AlternateContent>
+        <p:sp>
+          <p:nvSpPr>
+            <p:cNvPr id="2" name="TextBox 1">
+              <a:extLst>
+                <a:ext uri="{FF2B5EF4-FFF2-40B4-BE49-F238E27FC236}">
+                  <a16:creationId xmlns:a16="http://schemas.microsoft.com/office/drawing/2014/main" id="{B469A4EA-ECC8-47EA-B907-C5D0D7CC2E40}"/>
+                </a:ext>
+              </a:extLst>
+            </p:cNvPr>
+            <p:cNvSpPr txBox="1"/>
+            <p:nvPr/>
+          </p:nvSpPr>
+          <p:spPr>
+            <a:xfrm>
+              <a:off x="11569352" y="1288232"/>
+              <a:ext cx="1784976" cy="1754326"/>
+            </a:xfrm>
+            <a:prstGeom prst="rect">
+              <a:avLst/>
+            </a:prstGeom>
+            <a:noFill/>
+          </p:spPr>
+          <p:txBody>
+            <a:bodyPr wrap="none" rtlCol="0">
+              <a:spAutoFit/>
+            </a:bodyPr>
+            <a:lstStyle/>
+            <a:p>
+              <a:r>
+                <a:rPr lang="en-US" sz="3600" dirty="0"/>
+                <a:t>Act-</a:t>
+              </a:r>
+            </a:p>
+            <a:p>
+              <a:r>
+                <a:rPr lang="en-US" sz="3600" dirty="0"/>
+                <a:t>Execute-</a:t>
+              </a:r>
+            </a:p>
+            <a:p>
+              <a:r>
+                <a:rPr lang="en-US" sz="3600" dirty="0"/>
+                <a:t>Observe</a:t>
+              </a:r>
+            </a:p>
+          </p:txBody>
+        </p:sp>
+        <p:sp>
+          <p:nvSpPr>
+            <p:cNvPr id="199" name="TextBox 198">
+              <a:extLst>
+                <a:ext uri="{FF2B5EF4-FFF2-40B4-BE49-F238E27FC236}">
+                  <a16:creationId xmlns:a16="http://schemas.microsoft.com/office/drawing/2014/main" id="{93652FDC-38F9-4EB8-B36E-FFE969C05CEF}"/>
+                </a:ext>
+              </a:extLst>
+            </p:cNvPr>
+            <p:cNvSpPr txBox="1"/>
+            <p:nvPr/>
+          </p:nvSpPr>
+          <p:spPr>
+            <a:xfrm>
+              <a:off x="11569352" y="6223324"/>
+              <a:ext cx="1060162" cy="646331"/>
+            </a:xfrm>
+            <a:prstGeom prst="rect">
+              <a:avLst/>
+            </a:prstGeom>
+            <a:noFill/>
+          </p:spPr>
+          <p:txBody>
+            <a:bodyPr wrap="none" rtlCol="0">
+              <a:spAutoFit/>
+            </a:bodyPr>
+            <a:lstStyle/>
+            <a:p>
+              <a:r>
+                <a:rPr lang="en-US" sz="3600" dirty="0"/>
+                <a:t>Infer</a:t>
+              </a:r>
+            </a:p>
+          </p:txBody>
+        </p:sp>
+        <p:sp>
+          <p:nvSpPr>
+            <p:cNvPr id="202" name="TextBox 201">
+              <a:extLst>
+                <a:ext uri="{FF2B5EF4-FFF2-40B4-BE49-F238E27FC236}">
+                  <a16:creationId xmlns:a16="http://schemas.microsoft.com/office/drawing/2014/main" id="{5E4A4A8A-F126-45F0-99D1-4C7772065FFE}"/>
+                </a:ext>
+              </a:extLst>
+            </p:cNvPr>
+            <p:cNvSpPr txBox="1"/>
+            <p:nvPr/>
+          </p:nvSpPr>
+          <p:spPr>
+            <a:xfrm>
+              <a:off x="-760882" y="11447661"/>
+              <a:ext cx="1079142" cy="646331"/>
+            </a:xfrm>
+            <a:prstGeom prst="rect">
+              <a:avLst/>
+            </a:prstGeom>
+            <a:noFill/>
+          </p:spPr>
+          <p:txBody>
+            <a:bodyPr wrap="none" rtlCol="0">
+              <a:spAutoFit/>
+            </a:bodyPr>
+            <a:lstStyle/>
+            <a:p>
+              <a:r>
+                <a:rPr lang="en-US" sz="3600" dirty="0"/>
+                <a:t>Slide</a:t>
+              </a:r>
+            </a:p>
+          </p:txBody>
+        </p:sp>
       </p:grpSp>
     </p:spTree>
     <p:extLst>

</xml_diff>